<commit_message>
presentation (edit, not full)
</commit_message>
<xml_diff>
--- a/presentation/presentation.pptx
+++ b/presentation/presentation.pptx
@@ -5,7 +5,7 @@
     <p:sldMasterId id="2147483910" r:id="rId1"/>
   </p:sldMasterIdLst>
   <p:notesMasterIdLst>
-    <p:notesMasterId r:id="rId17"/>
+    <p:notesMasterId r:id="rId21"/>
   </p:notesMasterIdLst>
   <p:sldIdLst>
     <p:sldId id="256" r:id="rId2"/>
@@ -23,6 +23,10 @@
     <p:sldId id="270" r:id="rId14"/>
     <p:sldId id="271" r:id="rId15"/>
     <p:sldId id="272" r:id="rId16"/>
+    <p:sldId id="276" r:id="rId17"/>
+    <p:sldId id="273" r:id="rId18"/>
+    <p:sldId id="275" r:id="rId19"/>
+    <p:sldId id="274" r:id="rId20"/>
   </p:sldIdLst>
   <p:sldSz cx="12192000" cy="6858000"/>
   <p:notesSz cx="6858000" cy="9144000"/>
@@ -223,7 +227,7 @@
           <a:p>
             <a:fld id="{BD38AF1A-F700-477F-9701-3425B6DD9F89}" type="datetimeFigureOut">
               <a:rPr lang="ru-RU" smtClean="0"/>
-              <a:t>20.05.2022</a:t>
+              <a:t>21.05.2022</a:t>
             </a:fld>
             <a:endParaRPr lang="ru-RU"/>
           </a:p>
@@ -868,7 +872,7 @@
           <a:p>
             <a:fld id="{D964624D-D642-40FE-8217-9836CE1C07F6}" type="datetime1">
               <a:rPr lang="ru-RU" smtClean="0"/>
-              <a:t>20.05.2022</a:t>
+              <a:t>21.05.2022</a:t>
             </a:fld>
             <a:endParaRPr lang="ru-RU"/>
           </a:p>
@@ -1133,7 +1137,7 @@
           <a:p>
             <a:fld id="{8BC66FCF-5770-4E43-8093-1BC16AC05A37}" type="datetime1">
               <a:rPr lang="ru-RU" smtClean="0"/>
-              <a:t>20.05.2022</a:t>
+              <a:t>21.05.2022</a:t>
             </a:fld>
             <a:endParaRPr lang="ru-RU"/>
           </a:p>
@@ -1352,7 +1356,7 @@
           <a:p>
             <a:fld id="{AAD0150B-7E10-4F61-9E1C-16A2C05E1C73}" type="datetime1">
               <a:rPr lang="ru-RU" smtClean="0"/>
-              <a:t>20.05.2022</a:t>
+              <a:t>21.05.2022</a:t>
             </a:fld>
             <a:endParaRPr lang="ru-RU"/>
           </a:p>
@@ -1571,7 +1575,7 @@
           <a:p>
             <a:fld id="{A9094B30-0C85-4D71-A967-AFDCA616C8E5}" type="datetime1">
               <a:rPr lang="ru-RU" smtClean="0"/>
-              <a:t>20.05.2022</a:t>
+              <a:t>21.05.2022</a:t>
             </a:fld>
             <a:endParaRPr lang="ru-RU" dirty="0"/>
           </a:p>
@@ -2199,7 +2203,7 @@
           <a:p>
             <a:fld id="{6023883E-06BA-4349-963A-5BB9B245AA21}" type="datetime1">
               <a:rPr lang="ru-RU" smtClean="0"/>
-              <a:t>20.05.2022</a:t>
+              <a:t>21.05.2022</a:t>
             </a:fld>
             <a:endParaRPr lang="ru-RU"/>
           </a:p>
@@ -2676,7 +2680,7 @@
           <a:p>
             <a:fld id="{1042B335-8CB8-4CF0-B468-FCC8095C47BF}" type="datetime1">
               <a:rPr lang="ru-RU" smtClean="0"/>
-              <a:t>20.05.2022</a:t>
+              <a:t>21.05.2022</a:t>
             </a:fld>
             <a:endParaRPr lang="ru-RU"/>
           </a:p>
@@ -2835,7 +2839,7 @@
           <a:p>
             <a:fld id="{5133D046-C9A7-43AC-9D0C-09F3216B5A40}" type="datetime1">
               <a:rPr lang="ru-RU" smtClean="0"/>
-              <a:t>20.05.2022</a:t>
+              <a:t>21.05.2022</a:t>
             </a:fld>
             <a:endParaRPr lang="ru-RU"/>
           </a:p>
@@ -2963,7 +2967,7 @@
           <a:p>
             <a:fld id="{134425A0-5DAB-40A3-98AB-78A1DE8E4EF8}" type="datetime1">
               <a:rPr lang="ru-RU" smtClean="0"/>
-              <a:t>20.05.2022</a:t>
+              <a:t>21.05.2022</a:t>
             </a:fld>
             <a:endParaRPr lang="ru-RU"/>
           </a:p>
@@ -3295,7 +3299,7 @@
           <a:p>
             <a:fld id="{1A3FCD05-5FFF-44F2-9030-18DE05BCC82B}" type="datetime1">
               <a:rPr lang="ru-RU" smtClean="0"/>
-              <a:t>20.05.2022</a:t>
+              <a:t>21.05.2022</a:t>
             </a:fld>
             <a:endParaRPr lang="ru-RU"/>
           </a:p>
@@ -3609,7 +3613,7 @@
           <a:p>
             <a:fld id="{10964509-C4CF-44DF-AF94-81A42AD10F92}" type="datetime1">
               <a:rPr lang="ru-RU" smtClean="0"/>
-              <a:t>20.05.2022</a:t>
+              <a:t>21.05.2022</a:t>
             </a:fld>
             <a:endParaRPr lang="ru-RU"/>
           </a:p>
@@ -4235,7 +4239,23 @@
           <a:p>
             <a:r>
               <a:rPr lang="ru-RU" sz="2400" dirty="0"/>
-              <a:t>Научный руководитель: к.т.н., старший преподаватель, Шаронов И.О.</a:t>
+              <a:t>Научный руководитель: к.т.н., </a:t>
+            </a:r>
+            <a:r>
+              <a:rPr lang="ru-RU" sz="2400" dirty="0" err="1" smtClean="0"/>
+              <a:t>ст</a:t>
+            </a:r>
+            <a:r>
+              <a:rPr lang="en-US" sz="2400" dirty="0"/>
+              <a:t>.</a:t>
+            </a:r>
+            <a:r>
+              <a:rPr lang="ru-RU" sz="2400" dirty="0" smtClean="0"/>
+              <a:t> </a:t>
+            </a:r>
+            <a:r>
+              <a:rPr lang="ru-RU" sz="2400" dirty="0"/>
+              <a:t>преподаватель, Шаронов И.О.</a:t>
             </a:r>
           </a:p>
           <a:p>
@@ -7739,8 +7759,8 @@
           </a:p>
         </p:txBody>
       </p:sp>
-      <mc:AlternateContent xmlns:mc="http://schemas.openxmlformats.org/markup-compatibility/2006" xmlns:a14="http://schemas.microsoft.com/office/drawing/2010/main">
-        <mc:Choice Requires="a14">
+      <mc:AlternateContent xmlns:mc="http://schemas.openxmlformats.org/markup-compatibility/2006">
+        <mc:Choice xmlns:a14="http://schemas.microsoft.com/office/drawing/2010/main" Requires="a14">
           <p:sp>
             <p:nvSpPr>
               <p:cNvPr id="9" name="Объект 4">
@@ -8017,13 +8037,73 @@
                   <a:t>нейросети</a:t>
                 </a:r>
                 <a:r>
-                  <a:rPr lang="ru-RU" sz="2000" u="sng" dirty="0">
+                  <a:rPr lang="ru-RU" sz="2000" u="sng" dirty="0" smtClean="0">
                     <a:solidFill>
                       <a:schemeClr val="tx1"/>
                     </a:solidFill>
                   </a:rPr>
                   <a:t>:</a:t>
                 </a:r>
+              </a:p>
+              <a:p>
+                <a:pPr>
+                  <a:lnSpc>
+                    <a:spcPct val="100000"/>
+                  </a:lnSpc>
+                  <a:spcBef>
+                    <a:spcPts val="600"/>
+                  </a:spcBef>
+                </a:pPr>
+                <a:r>
+                  <a:rPr lang="ru-RU" sz="2000" dirty="0" smtClean="0">
+                    <a:solidFill>
+                      <a:schemeClr val="tx1"/>
+                    </a:solidFill>
+                  </a:rPr>
+                  <a:t>Функция активации скрытых слоев – </a:t>
+                </a:r>
+                <a:r>
+                  <a:rPr lang="en-US" sz="2000" dirty="0" err="1" smtClean="0">
+                    <a:solidFill>
+                      <a:schemeClr val="tx1"/>
+                    </a:solidFill>
+                  </a:rPr>
+                  <a:t>ReLU</a:t>
+                </a:r>
+                <a:r>
+                  <a:rPr lang="ru-RU" sz="2000" dirty="0" smtClean="0">
+                    <a:solidFill>
+                      <a:schemeClr val="tx1"/>
+                    </a:solidFill>
+                  </a:rPr>
+                  <a:t>, количество узлов - </a:t>
+                </a:r>
+                <a14:m>
+                  <m:oMath xmlns:m="http://schemas.openxmlformats.org/officeDocument/2006/math">
+                    <m:r>
+                      <a:rPr lang="ru-RU" sz="2000" i="1" dirty="0" smtClean="0">
+                        <a:solidFill>
+                          <a:schemeClr val="tx1"/>
+                        </a:solidFill>
+                        <a:latin typeface="Cambria Math" panose="02040503050406030204" pitchFamily="18" charset="0"/>
+                      </a:rPr>
+                      <m:t>512</m:t>
+                    </m:r>
+                  </m:oMath>
+                </a14:m>
+                <a:r>
+                  <a:rPr lang="en-US" sz="2000" dirty="0" smtClean="0">
+                    <a:solidFill>
+                      <a:schemeClr val="tx1"/>
+                    </a:solidFill>
+                  </a:rPr>
+                  <a:t>;</a:t>
+                </a:r>
+                <a:endParaRPr lang="ru-RU" sz="2000" dirty="0">
+                  <a:solidFill>
+                    <a:schemeClr val="tx1"/>
+                  </a:solidFill>
+                </a:endParaRPr>
               </a:p>
               <a:p>
                 <a:pPr>
@@ -8498,7 +8578,7 @@
             </p:txBody>
           </p:sp>
         </mc:Choice>
-        <mc:Fallback xmlns="">
+        <mc:Fallback>
           <p:sp>
             <p:nvSpPr>
               <p:cNvPr id="9" name="Объект 4">
@@ -8524,7 +8604,7 @@
               <a:blipFill>
                 <a:blip r:embed="rId3"/>
                 <a:stretch>
-                  <a:fillRect l="-279" t="-1073" r="-931" b="-4292"/>
+                  <a:fillRect l="-279" t="-1073" r="-931" b="-28541"/>
                 </a:stretch>
               </a:blipFill>
             </p:spPr>
@@ -8543,8 +8623,8 @@
           </p:sp>
         </mc:Fallback>
       </mc:AlternateContent>
-      <mc:AlternateContent xmlns:mc="http://schemas.openxmlformats.org/markup-compatibility/2006" xmlns:a14="http://schemas.microsoft.com/office/drawing/2010/main">
-        <mc:Choice Requires="a14">
+      <mc:AlternateContent xmlns:mc="http://schemas.openxmlformats.org/markup-compatibility/2006">
+        <mc:Choice xmlns:a14="http://schemas.microsoft.com/office/drawing/2010/main" Requires="a14">
           <p:sp>
             <p:nvSpPr>
               <p:cNvPr id="6" name="Прямоугольник 5"/>
@@ -8553,7 +8633,7 @@
             </p:nvSpPr>
             <p:spPr>
               <a:xfrm>
-                <a:off x="731303" y="3588898"/>
+                <a:off x="731303" y="4315068"/>
                 <a:ext cx="10902400" cy="1223605"/>
               </a:xfrm>
               <a:prstGeom prst="rect">
@@ -8918,7 +8998,7 @@
             </p:txBody>
           </p:sp>
         </mc:Choice>
-        <mc:Fallback xmlns="">
+        <mc:Fallback>
           <p:sp>
             <p:nvSpPr>
               <p:cNvPr id="6" name="Прямоугольник 5"/>
@@ -8929,7 +9009,7 @@
             </p:nvSpPr>
             <p:spPr>
               <a:xfrm>
-                <a:off x="731303" y="3588898"/>
+                <a:off x="731303" y="4315068"/>
                 <a:ext cx="10902400" cy="1223605"/>
               </a:xfrm>
               <a:prstGeom prst="rect">
@@ -8938,7 +9018,7 @@
               <a:blipFill>
                 <a:blip r:embed="rId4"/>
                 <a:stretch>
-                  <a:fillRect l="-503" t="-3000" r="-447" b="-22500"/>
+                  <a:fillRect l="-503" t="-2985" r="-447" b="-21891"/>
                 </a:stretch>
               </a:blipFill>
             </p:spPr>
@@ -9059,8 +9139,8 @@
           </a:p>
         </p:txBody>
       </p:sp>
-      <mc:AlternateContent xmlns:mc="http://schemas.openxmlformats.org/markup-compatibility/2006" xmlns:a14="http://schemas.microsoft.com/office/drawing/2010/main">
-        <mc:Choice Requires="a14">
+      <mc:AlternateContent xmlns:mc="http://schemas.openxmlformats.org/markup-compatibility/2006">
+        <mc:Choice xmlns:a14="http://schemas.microsoft.com/office/drawing/2010/main" Requires="a14">
           <p:sp>
             <p:nvSpPr>
               <p:cNvPr id="12" name="Объект 4">
@@ -9668,23 +9748,7 @@
                       <a:schemeClr val="tx1"/>
                     </a:solidFill>
                   </a:rPr>
-                  <a:t>1</a:t>
-                </a:r>
-                <a:r>
-                  <a:rPr lang="en-US" sz="2000" dirty="0" smtClean="0">
-                    <a:solidFill>
-                      <a:schemeClr val="tx1"/>
-                    </a:solidFill>
-                  </a:rPr>
-                  <a:t>6</a:t>
-                </a:r>
-                <a:r>
-                  <a:rPr lang="ru-RU" sz="2000" dirty="0" smtClean="0">
-                    <a:solidFill>
-                      <a:schemeClr val="tx1"/>
-                    </a:solidFill>
-                  </a:rPr>
-                  <a:t>)</a:t>
+                  <a:t>17)</a:t>
                 </a:r>
                 <a:endParaRPr lang="ru-RU" sz="2000" dirty="0">
                   <a:solidFill>
@@ -9809,7 +9873,7 @@
             </p:txBody>
           </p:sp>
         </mc:Choice>
-        <mc:Fallback xmlns="">
+        <mc:Fallback>
           <p:sp>
             <p:nvSpPr>
               <p:cNvPr id="12" name="Объект 4">
@@ -9835,7 +9899,7 @@
               <a:blipFill>
                 <a:blip r:embed="rId2"/>
                 <a:stretch>
-                  <a:fillRect l="-116" t="-2088" r="-464" b="-1044"/>
+                  <a:fillRect l="-116" t="-2088" r="-174" b="-1044"/>
                 </a:stretch>
               </a:blipFill>
             </p:spPr>
@@ -9916,8 +9980,21 @@
                   <a:schemeClr val="tx1"/>
                 </a:solidFill>
               </a:rPr>
-              <a:t> – спектрограммы, полученные из спектра сигнала;</a:t>
-            </a:r>
+              <a:t> – спектрограммы, полученные из спектра </a:t>
+            </a:r>
+            <a:r>
+              <a:rPr lang="ru-RU" sz="2000" dirty="0" smtClean="0">
+                <a:solidFill>
+                  <a:schemeClr val="tx1"/>
+                </a:solidFill>
+              </a:rPr>
+              <a:t>сигнала (модель 1);</a:t>
+            </a:r>
+            <a:endParaRPr lang="ru-RU" sz="2000" dirty="0">
+              <a:solidFill>
+                <a:schemeClr val="tx1"/>
+              </a:solidFill>
+            </a:endParaRPr>
           </a:p>
           <a:p>
             <a:pPr marL="45720" indent="0">
@@ -9964,7 +10041,7 @@
                   <a:schemeClr val="tx1"/>
                 </a:solidFill>
               </a:rPr>
-              <a:t>.</a:t>
+              <a:t> (модель 2).</a:t>
             </a:r>
             <a:endParaRPr lang="ru-RU" sz="2000" dirty="0">
               <a:solidFill>
@@ -10054,7 +10131,11 @@
           <a:p>
             <a:r>
               <a:rPr lang="ru-RU" sz="3200" dirty="0"/>
-              <a:t>Реализация. Результаты первого подхода.</a:t>
+              <a:t>Реализация. Результаты </a:t>
+            </a:r>
+            <a:r>
+              <a:rPr lang="ru-RU" sz="3200" dirty="0" smtClean="0"/>
+              <a:t>для модели 1.</a:t>
             </a:r>
             <a:endParaRPr lang="ru-RU" sz="4800" dirty="0"/>
           </a:p>
@@ -10710,7 +10791,11 @@
           <a:p>
             <a:r>
               <a:rPr lang="ru-RU" sz="3200" dirty="0"/>
-              <a:t>Реализация. Результаты второго подхода.</a:t>
+              <a:t>Реализация. Результаты </a:t>
+            </a:r>
+            <a:r>
+              <a:rPr lang="ru-RU" sz="3200" dirty="0" smtClean="0"/>
+              <a:t>для модели 2.</a:t>
             </a:r>
             <a:endParaRPr lang="ru-RU" sz="4800" dirty="0"/>
           </a:p>
@@ -11160,6 +11245,883 @@
     <p:extLst>
       <p:ext uri="{BB962C8B-B14F-4D97-AF65-F5344CB8AC3E}">
         <p14:creationId xmlns:p14="http://schemas.microsoft.com/office/powerpoint/2010/main" val="4112701935"/>
+      </p:ext>
+    </p:extLst>
+  </p:cSld>
+  <p:clrMapOvr>
+    <a:masterClrMapping/>
+  </p:clrMapOvr>
+</p:sld>
+</file>
+
+<file path=ppt/slides/slide16.xml><?xml version="1.0" encoding="utf-8"?>
+<p:sld xmlns:a="http://schemas.openxmlformats.org/drawingml/2006/main" xmlns:r="http://schemas.openxmlformats.org/officeDocument/2006/relationships" xmlns:p="http://schemas.openxmlformats.org/presentationml/2006/main">
+  <p:cSld>
+    <p:spTree>
+      <p:nvGrpSpPr>
+        <p:cNvPr id="1" name=""/>
+        <p:cNvGrpSpPr/>
+        <p:nvPr/>
+      </p:nvGrpSpPr>
+      <p:grpSpPr>
+        <a:xfrm>
+          <a:off x="0" y="0"/>
+          <a:ext cx="0" cy="0"/>
+          <a:chOff x="0" y="0"/>
+          <a:chExt cx="0" cy="0"/>
+        </a:xfrm>
+      </p:grpSpPr>
+      <p:sp>
+        <p:nvSpPr>
+          <p:cNvPr id="2" name="Заголовок 1"/>
+          <p:cNvSpPr>
+            <a:spLocks noGrp="1"/>
+          </p:cNvSpPr>
+          <p:nvPr>
+            <p:ph type="title"/>
+          </p:nvPr>
+        </p:nvSpPr>
+        <p:spPr>
+          <a:xfrm>
+            <a:off x="838200" y="365126"/>
+            <a:ext cx="10515600" cy="514106"/>
+          </a:xfrm>
+        </p:spPr>
+        <p:txBody>
+          <a:bodyPr>
+            <a:noAutofit/>
+          </a:bodyPr>
+          <a:lstStyle/>
+          <a:p>
+            <a:r>
+              <a:rPr lang="ru-RU" sz="3200" dirty="0" smtClean="0"/>
+              <a:t>Демонстрационный пример</a:t>
+            </a:r>
+            <a:endParaRPr lang="ru-RU" sz="4800" dirty="0"/>
+          </a:p>
+        </p:txBody>
+      </p:sp>
+      <p:sp>
+        <p:nvSpPr>
+          <p:cNvPr id="11" name="Номер слайда 10">
+            <a:extLst>
+              <a:ext uri="{FF2B5EF4-FFF2-40B4-BE49-F238E27FC236}">
+                <a16:creationId xmlns:a16="http://schemas.microsoft.com/office/drawing/2014/main" id="{3A91D745-9CA6-414C-AEAB-25A55984B29C}"/>
+              </a:ext>
+            </a:extLst>
+          </p:cNvPr>
+          <p:cNvSpPr>
+            <a:spLocks noGrp="1"/>
+          </p:cNvSpPr>
+          <p:nvPr>
+            <p:ph type="sldNum" sz="quarter" idx="12"/>
+          </p:nvPr>
+        </p:nvSpPr>
+        <p:spPr/>
+        <p:txBody>
+          <a:bodyPr/>
+          <a:lstStyle/>
+          <a:p>
+            <a:fld id="{871F4C9F-061D-468D-90C1-298C9849AF70}" type="slidenum">
+              <a:rPr lang="ru-RU" smtClean="0"/>
+              <a:pPr/>
+              <a:t>16</a:t>
+            </a:fld>
+            <a:r>
+              <a:rPr lang="en-US"/>
+              <a:t>/</a:t>
+            </a:r>
+            <a:r>
+              <a:rPr lang="ru-RU"/>
+              <a:t>20</a:t>
+            </a:r>
+            <a:endParaRPr lang="ru-RU" dirty="0"/>
+          </a:p>
+        </p:txBody>
+      </p:sp>
+      <p:pic>
+        <p:nvPicPr>
+          <p:cNvPr id="4" name="Рисунок 3"/>
+          <p:cNvPicPr>
+            <a:picLocks noChangeAspect="1"/>
+          </p:cNvPicPr>
+          <p:nvPr/>
+        </p:nvPicPr>
+        <p:blipFill>
+          <a:blip r:embed="rId2"/>
+          <a:stretch>
+            <a:fillRect/>
+          </a:stretch>
+        </p:blipFill>
+        <p:spPr>
+          <a:xfrm>
+            <a:off x="601717" y="1166918"/>
+            <a:ext cx="5231816" cy="3553836"/>
+          </a:xfrm>
+          <a:prstGeom prst="rect">
+            <a:avLst/>
+          </a:prstGeom>
+        </p:spPr>
+      </p:pic>
+      <p:sp>
+        <p:nvSpPr>
+          <p:cNvPr id="8" name="Прямоугольник 7">
+            <a:extLst>
+              <a:ext uri="{FF2B5EF4-FFF2-40B4-BE49-F238E27FC236}">
+                <a16:creationId xmlns:a16="http://schemas.microsoft.com/office/drawing/2014/main" id="{7C1103C7-41C2-4629-B25D-2C4B9CCE1563}"/>
+              </a:ext>
+            </a:extLst>
+          </p:cNvPr>
+          <p:cNvSpPr/>
+          <p:nvPr/>
+        </p:nvSpPr>
+        <p:spPr>
+          <a:xfrm>
+            <a:off x="3085388" y="4748087"/>
+            <a:ext cx="516721" cy="338554"/>
+          </a:xfrm>
+          <a:prstGeom prst="rect">
+            <a:avLst/>
+          </a:prstGeom>
+        </p:spPr>
+        <p:txBody>
+          <a:bodyPr wrap="square">
+            <a:spAutoFit/>
+          </a:bodyPr>
+          <a:lstStyle/>
+          <a:p>
+            <a:pPr algn="ctr">
+              <a:spcAft>
+                <a:spcPts val="0"/>
+              </a:spcAft>
+            </a:pPr>
+            <a:r>
+              <a:rPr lang="ru-RU" sz="1600" dirty="0">
+                <a:ea typeface="Times New Roman" panose="02020603050405020304" pitchFamily="18" charset="0"/>
+              </a:rPr>
+              <a:t>(а)</a:t>
+            </a:r>
+          </a:p>
+        </p:txBody>
+      </p:sp>
+      <mc:AlternateContent xmlns:mc="http://schemas.openxmlformats.org/markup-compatibility/2006">
+        <mc:Choice xmlns:a14="http://schemas.microsoft.com/office/drawing/2010/main" Requires="a14">
+          <p:sp>
+            <p:nvSpPr>
+              <p:cNvPr id="9" name="Прямоугольник 8">
+                <a:extLst>
+                  <a:ext uri="{FF2B5EF4-FFF2-40B4-BE49-F238E27FC236}">
+                    <a16:creationId xmlns:a16="http://schemas.microsoft.com/office/drawing/2014/main" id="{7C1103C7-41C2-4629-B25D-2C4B9CCE1563}"/>
+                  </a:ext>
+                </a:extLst>
+              </p:cNvPr>
+              <p:cNvSpPr/>
+              <p:nvPr/>
+            </p:nvSpPr>
+            <p:spPr>
+              <a:xfrm>
+                <a:off x="251175" y="5505782"/>
+                <a:ext cx="11689649" cy="338554"/>
+              </a:xfrm>
+              <a:prstGeom prst="rect">
+                <a:avLst/>
+              </a:prstGeom>
+            </p:spPr>
+            <p:txBody>
+              <a:bodyPr wrap="square">
+                <a:spAutoFit/>
+              </a:bodyPr>
+              <a:lstStyle/>
+              <a:p>
+                <a:pPr algn="ctr">
+                  <a:spcAft>
+                    <a:spcPts val="0"/>
+                  </a:spcAft>
+                </a:pPr>
+                <a:r>
+                  <a:rPr lang="ru-RU" sz="1600" dirty="0" smtClean="0">
+                    <a:ea typeface="Times New Roman" panose="02020603050405020304" pitchFamily="18" charset="0"/>
+                  </a:rPr>
+                  <a:t>Рис</a:t>
+                </a:r>
+                <a:r>
+                  <a:rPr lang="en-US" sz="1600" dirty="0" smtClean="0">
+                    <a:ea typeface="Times New Roman" panose="02020603050405020304" pitchFamily="18" charset="0"/>
+                  </a:rPr>
+                  <a:t>.</a:t>
+                </a:r>
+                <a:r>
+                  <a:rPr lang="ru-RU" sz="1600" dirty="0" smtClean="0">
+                    <a:ea typeface="Times New Roman" panose="02020603050405020304" pitchFamily="18" charset="0"/>
+                  </a:rPr>
+                  <a:t>7</a:t>
+                </a:r>
+                <a:r>
+                  <a:rPr lang="en-US" sz="1600" dirty="0" smtClean="0">
+                    <a:ea typeface="Times New Roman" panose="02020603050405020304" pitchFamily="18" charset="0"/>
+                  </a:rPr>
+                  <a:t>. </a:t>
+                </a:r>
+                <a:r>
+                  <a:rPr lang="ru-RU" sz="1600" dirty="0">
+                    <a:ea typeface="Times New Roman" panose="02020603050405020304" pitchFamily="18" charset="0"/>
+                  </a:rPr>
+                  <a:t>Результаты </a:t>
+                </a:r>
+                <a:r>
+                  <a:rPr lang="ru-RU" sz="1600" dirty="0" smtClean="0">
+                    <a:ea typeface="Times New Roman" panose="02020603050405020304" pitchFamily="18" charset="0"/>
+                  </a:rPr>
+                  <a:t>для демонстрационного файла. (</a:t>
+                </a:r>
+                <a:r>
+                  <a:rPr lang="ru-RU" sz="1600" dirty="0">
+                    <a:ea typeface="Times New Roman" panose="02020603050405020304" pitchFamily="18" charset="0"/>
+                  </a:rPr>
+                  <a:t>а) – </a:t>
+                </a:r>
+                <a:r>
+                  <a:rPr lang="ru-RU" sz="1600" dirty="0" smtClean="0">
+                    <a:ea typeface="Times New Roman" panose="02020603050405020304" pitchFamily="18" charset="0"/>
+                  </a:rPr>
+                  <a:t>модель 1, точность –</a:t>
+                </a:r>
+                <a14:m>
+                  <m:oMath xmlns:m="http://schemas.openxmlformats.org/officeDocument/2006/math">
+                    <m:r>
+                      <a:rPr lang="en-US" sz="1600" i="1" dirty="0" smtClean="0">
+                        <a:latin typeface="Cambria Math" panose="02040503050406030204" pitchFamily="18" charset="0"/>
+                        <a:ea typeface="Times New Roman" panose="02020603050405020304" pitchFamily="18" charset="0"/>
+                      </a:rPr>
+                      <m:t>43.75%</m:t>
+                    </m:r>
+                  </m:oMath>
+                </a14:m>
+                <a:r>
+                  <a:rPr lang="ru-RU" sz="1600" dirty="0" smtClean="0">
+                    <a:ea typeface="Times New Roman" panose="02020603050405020304" pitchFamily="18" charset="0"/>
+                  </a:rPr>
+                  <a:t>. </a:t>
+                </a:r>
+                <a:r>
+                  <a:rPr lang="ru-RU" sz="1600" dirty="0">
+                    <a:ea typeface="Times New Roman" panose="02020603050405020304" pitchFamily="18" charset="0"/>
+                  </a:rPr>
+                  <a:t>(б) </a:t>
+                </a:r>
+                <a:r>
+                  <a:rPr lang="ru-RU" sz="1600" dirty="0" smtClean="0">
+                    <a:ea typeface="Times New Roman" panose="02020603050405020304" pitchFamily="18" charset="0"/>
+                  </a:rPr>
+                  <a:t> - модель 2, точность - </a:t>
+                </a:r>
+                <a14:m>
+                  <m:oMath xmlns:m="http://schemas.openxmlformats.org/officeDocument/2006/math">
+                    <m:r>
+                      <a:rPr lang="en-US" sz="1600" b="0" i="1" smtClean="0">
+                        <a:latin typeface="Cambria Math" panose="02040503050406030204" pitchFamily="18" charset="0"/>
+                        <a:ea typeface="Times New Roman" panose="02020603050405020304" pitchFamily="18" charset="0"/>
+                      </a:rPr>
+                      <m:t>21.88%</m:t>
+                    </m:r>
+                  </m:oMath>
+                </a14:m>
+                <a:r>
+                  <a:rPr lang="ru-RU" sz="1600" dirty="0" smtClean="0">
+                    <a:ea typeface="Times New Roman" panose="02020603050405020304" pitchFamily="18" charset="0"/>
+                  </a:rPr>
+                  <a:t>. </a:t>
+                </a:r>
+                <a:endParaRPr lang="ru-RU" sz="1600" dirty="0">
+                  <a:ea typeface="Times New Roman" panose="02020603050405020304" pitchFamily="18" charset="0"/>
+                </a:endParaRPr>
+              </a:p>
+            </p:txBody>
+          </p:sp>
+        </mc:Choice>
+        <mc:Fallback>
+          <p:sp>
+            <p:nvSpPr>
+              <p:cNvPr id="9" name="Прямоугольник 8">
+                <a:extLst>
+                  <a:ext uri="{FF2B5EF4-FFF2-40B4-BE49-F238E27FC236}">
+                    <a16:creationId xmlns:a16="http://schemas.microsoft.com/office/drawing/2014/main" id="{7C1103C7-41C2-4629-B25D-2C4B9CCE1563}"/>
+                  </a:ext>
+                </a:extLst>
+              </p:cNvPr>
+              <p:cNvSpPr>
+                <a:spLocks noRot="1" noChangeAspect="1" noMove="1" noResize="1" noEditPoints="1" noAdjustHandles="1" noChangeArrowheads="1" noChangeShapeType="1" noTextEdit="1"/>
+              </p:cNvSpPr>
+              <p:nvPr/>
+            </p:nvSpPr>
+            <p:spPr>
+              <a:xfrm>
+                <a:off x="251175" y="5505782"/>
+                <a:ext cx="11689649" cy="338554"/>
+              </a:xfrm>
+              <a:prstGeom prst="rect">
+                <a:avLst/>
+              </a:prstGeom>
+              <a:blipFill>
+                <a:blip r:embed="rId3"/>
+                <a:stretch>
+                  <a:fillRect t="-5357" b="-21429"/>
+                </a:stretch>
+              </a:blipFill>
+            </p:spPr>
+            <p:txBody>
+              <a:bodyPr/>
+              <a:lstStyle/>
+              <a:p>
+                <a:r>
+                  <a:rPr lang="ru-RU">
+                    <a:noFill/>
+                  </a:rPr>
+                  <a:t> </a:t>
+                </a:r>
+              </a:p>
+            </p:txBody>
+          </p:sp>
+        </mc:Fallback>
+      </mc:AlternateContent>
+      <p:pic>
+        <p:nvPicPr>
+          <p:cNvPr id="6" name="Рисунок 5"/>
+          <p:cNvPicPr>
+            <a:picLocks noChangeAspect="1"/>
+          </p:cNvPicPr>
+          <p:nvPr/>
+        </p:nvPicPr>
+        <p:blipFill>
+          <a:blip r:embed="rId4"/>
+          <a:stretch>
+            <a:fillRect/>
+          </a:stretch>
+        </p:blipFill>
+        <p:spPr>
+          <a:xfrm>
+            <a:off x="6322265" y="1166918"/>
+            <a:ext cx="5187966" cy="3553836"/>
+          </a:xfrm>
+          <a:prstGeom prst="rect">
+            <a:avLst/>
+          </a:prstGeom>
+        </p:spPr>
+      </p:pic>
+      <p:sp>
+        <p:nvSpPr>
+          <p:cNvPr id="13" name="Прямоугольник 12">
+            <a:extLst>
+              <a:ext uri="{FF2B5EF4-FFF2-40B4-BE49-F238E27FC236}">
+                <a16:creationId xmlns:a16="http://schemas.microsoft.com/office/drawing/2014/main" id="{7C1103C7-41C2-4629-B25D-2C4B9CCE1563}"/>
+              </a:ext>
+            </a:extLst>
+          </p:cNvPr>
+          <p:cNvSpPr/>
+          <p:nvPr/>
+        </p:nvSpPr>
+        <p:spPr>
+          <a:xfrm>
+            <a:off x="8876523" y="4720754"/>
+            <a:ext cx="516721" cy="338554"/>
+          </a:xfrm>
+          <a:prstGeom prst="rect">
+            <a:avLst/>
+          </a:prstGeom>
+        </p:spPr>
+        <p:txBody>
+          <a:bodyPr wrap="square">
+            <a:spAutoFit/>
+          </a:bodyPr>
+          <a:lstStyle/>
+          <a:p>
+            <a:pPr algn="ctr">
+              <a:spcAft>
+                <a:spcPts val="0"/>
+              </a:spcAft>
+            </a:pPr>
+            <a:r>
+              <a:rPr lang="ru-RU" sz="1600" dirty="0" smtClean="0">
+                <a:ea typeface="Times New Roman" panose="02020603050405020304" pitchFamily="18" charset="0"/>
+              </a:rPr>
+              <a:t>(б)</a:t>
+            </a:r>
+            <a:endParaRPr lang="ru-RU" sz="1600" dirty="0">
+              <a:ea typeface="Times New Roman" panose="02020603050405020304" pitchFamily="18" charset="0"/>
+            </a:endParaRPr>
+          </a:p>
+        </p:txBody>
+      </p:sp>
+    </p:spTree>
+    <p:extLst>
+      <p:ext uri="{BB962C8B-B14F-4D97-AF65-F5344CB8AC3E}">
+        <p14:creationId xmlns:p14="http://schemas.microsoft.com/office/powerpoint/2010/main" val="3972199236"/>
+      </p:ext>
+    </p:extLst>
+  </p:cSld>
+  <p:clrMapOvr>
+    <a:masterClrMapping/>
+  </p:clrMapOvr>
+</p:sld>
+</file>
+
+<file path=ppt/slides/slide17.xml><?xml version="1.0" encoding="utf-8"?>
+<p:sld xmlns:a="http://schemas.openxmlformats.org/drawingml/2006/main" xmlns:r="http://schemas.openxmlformats.org/officeDocument/2006/relationships" xmlns:p="http://schemas.openxmlformats.org/presentationml/2006/main">
+  <p:cSld>
+    <p:spTree>
+      <p:nvGrpSpPr>
+        <p:cNvPr id="1" name=""/>
+        <p:cNvGrpSpPr/>
+        <p:nvPr/>
+      </p:nvGrpSpPr>
+      <p:grpSpPr>
+        <a:xfrm>
+          <a:off x="0" y="0"/>
+          <a:ext cx="0" cy="0"/>
+          <a:chOff x="0" y="0"/>
+          <a:chExt cx="0" cy="0"/>
+        </a:xfrm>
+      </p:grpSpPr>
+      <p:sp>
+        <p:nvSpPr>
+          <p:cNvPr id="2" name="Заголовок 1"/>
+          <p:cNvSpPr>
+            <a:spLocks noGrp="1"/>
+          </p:cNvSpPr>
+          <p:nvPr>
+            <p:ph type="title"/>
+          </p:nvPr>
+        </p:nvSpPr>
+        <p:spPr>
+          <a:xfrm>
+            <a:off x="838200" y="365125"/>
+            <a:ext cx="10515600" cy="760673"/>
+          </a:xfrm>
+        </p:spPr>
+        <p:txBody>
+          <a:bodyPr>
+            <a:noAutofit/>
+          </a:bodyPr>
+          <a:lstStyle/>
+          <a:p>
+            <a:r>
+              <a:rPr lang="ru-RU" sz="3200" dirty="0" smtClean="0"/>
+              <a:t>Выводы по промежуточным результатам и дальнейшая работа</a:t>
+            </a:r>
+            <a:endParaRPr lang="ru-RU" sz="4800" dirty="0"/>
+          </a:p>
+        </p:txBody>
+      </p:sp>
+      <p:sp>
+        <p:nvSpPr>
+          <p:cNvPr id="11" name="Номер слайда 10">
+            <a:extLst>
+              <a:ext uri="{FF2B5EF4-FFF2-40B4-BE49-F238E27FC236}">
+                <a16:creationId xmlns:a16="http://schemas.microsoft.com/office/drawing/2014/main" id="{3A91D745-9CA6-414C-AEAB-25A55984B29C}"/>
+              </a:ext>
+            </a:extLst>
+          </p:cNvPr>
+          <p:cNvSpPr>
+            <a:spLocks noGrp="1"/>
+          </p:cNvSpPr>
+          <p:nvPr>
+            <p:ph type="sldNum" sz="quarter" idx="12"/>
+          </p:nvPr>
+        </p:nvSpPr>
+        <p:spPr/>
+        <p:txBody>
+          <a:bodyPr/>
+          <a:lstStyle/>
+          <a:p>
+            <a:fld id="{871F4C9F-061D-468D-90C1-298C9849AF70}" type="slidenum">
+              <a:rPr lang="ru-RU" smtClean="0"/>
+              <a:pPr/>
+              <a:t>17</a:t>
+            </a:fld>
+            <a:r>
+              <a:rPr lang="en-US"/>
+              <a:t>/</a:t>
+            </a:r>
+            <a:r>
+              <a:rPr lang="ru-RU"/>
+              <a:t>20</a:t>
+            </a:r>
+            <a:endParaRPr lang="ru-RU" dirty="0"/>
+          </a:p>
+        </p:txBody>
+      </p:sp>
+      <p:sp>
+        <p:nvSpPr>
+          <p:cNvPr id="7" name="Объект 4">
+            <a:extLst>
+              <a:ext uri="{FF2B5EF4-FFF2-40B4-BE49-F238E27FC236}">
+                <a16:creationId xmlns:a16="http://schemas.microsoft.com/office/drawing/2014/main" id="{CECBFFEE-5029-4E7A-AB57-EE46E254E3E1}"/>
+              </a:ext>
+            </a:extLst>
+          </p:cNvPr>
+          <p:cNvSpPr>
+            <a:spLocks noGrp="1"/>
+          </p:cNvSpPr>
+          <p:nvPr>
+            <p:ph idx="1"/>
+          </p:nvPr>
+        </p:nvSpPr>
+        <p:spPr>
+          <a:xfrm>
+            <a:off x="838200" y="1466193"/>
+            <a:ext cx="10515599" cy="3342290"/>
+          </a:xfrm>
+        </p:spPr>
+        <p:txBody>
+          <a:bodyPr/>
+          <a:lstStyle/>
+          <a:p>
+            <a:pPr marL="45720" indent="0">
+              <a:buNone/>
+            </a:pPr>
+            <a:r>
+              <a:rPr lang="ru-RU" sz="2000" dirty="0" smtClean="0">
+                <a:solidFill>
+                  <a:schemeClr val="tx1"/>
+                </a:solidFill>
+              </a:rPr>
+              <a:t>Выводы:</a:t>
+            </a:r>
+          </a:p>
+          <a:p>
+            <a:r>
+              <a:rPr lang="ru-RU" sz="2000" dirty="0">
+                <a:solidFill>
+                  <a:schemeClr val="tx1"/>
+                </a:solidFill>
+              </a:rPr>
+              <a:t>Оба </a:t>
+            </a:r>
+            <a:r>
+              <a:rPr lang="ru-RU" sz="2000" dirty="0">
+                <a:solidFill>
+                  <a:schemeClr val="tx1"/>
+                </a:solidFill>
+              </a:rPr>
+              <a:t>подхода дают неплохую точность распознавания нот при обучении, но при демонстрации их точность довольно низкая</a:t>
+            </a:r>
+            <a:r>
+              <a:rPr lang="ru-RU" sz="2000" dirty="0">
+                <a:solidFill>
+                  <a:schemeClr val="tx1"/>
+                </a:solidFill>
+              </a:rPr>
+              <a:t>;</a:t>
+            </a:r>
+          </a:p>
+          <a:p>
+            <a:r>
+              <a:rPr lang="ru-RU" sz="2000" dirty="0" smtClean="0">
+                <a:solidFill>
+                  <a:schemeClr val="tx1"/>
+                </a:solidFill>
+              </a:rPr>
+              <a:t>При использовании обоих подходов присутствует переобучение.</a:t>
+            </a:r>
+          </a:p>
+          <a:p>
+            <a:pPr marL="45720" indent="0">
+              <a:buNone/>
+            </a:pPr>
+            <a:r>
+              <a:rPr lang="ru-RU" sz="2000" dirty="0" smtClean="0">
+                <a:solidFill>
+                  <a:schemeClr val="tx1"/>
+                </a:solidFill>
+              </a:rPr>
+              <a:t>Следующие шаги исследования для модели 2:</a:t>
+            </a:r>
+          </a:p>
+          <a:p>
+            <a:pPr marL="502920" indent="-457200">
+              <a:buFont typeface="+mj-lt"/>
+              <a:buAutoNum type="arabicPeriod"/>
+            </a:pPr>
+            <a:r>
+              <a:rPr lang="ru-RU" sz="2000" dirty="0" smtClean="0">
+                <a:solidFill>
+                  <a:schemeClr val="tx1"/>
+                </a:solidFill>
+              </a:rPr>
+              <a:t>Изменение шага окна;</a:t>
+            </a:r>
+          </a:p>
+          <a:p>
+            <a:pPr marL="502920" indent="-457200">
+              <a:buFont typeface="+mj-lt"/>
+              <a:buAutoNum type="arabicPeriod"/>
+            </a:pPr>
+            <a:r>
+              <a:rPr lang="ru-RU" sz="2000" dirty="0" smtClean="0">
+                <a:solidFill>
+                  <a:schemeClr val="tx1"/>
+                </a:solidFill>
+              </a:rPr>
+              <a:t>Изменение количества кадров, подаваемых на вход </a:t>
+            </a:r>
+            <a:r>
+              <a:rPr lang="ru-RU" sz="2000" dirty="0" err="1" smtClean="0">
+                <a:solidFill>
+                  <a:schemeClr val="tx1"/>
+                </a:solidFill>
+              </a:rPr>
+              <a:t>нейросети</a:t>
+            </a:r>
+            <a:r>
+              <a:rPr lang="ru-RU" sz="2000" dirty="0" smtClean="0">
+                <a:solidFill>
+                  <a:schemeClr val="tx1"/>
+                </a:solidFill>
+              </a:rPr>
+              <a:t>;</a:t>
+            </a:r>
+          </a:p>
+          <a:p>
+            <a:pPr marL="502920" indent="-457200">
+              <a:buFont typeface="+mj-lt"/>
+              <a:buAutoNum type="arabicPeriod"/>
+            </a:pPr>
+            <a:r>
+              <a:rPr lang="ru-RU" sz="2000" dirty="0" smtClean="0">
+                <a:solidFill>
+                  <a:schemeClr val="tx1"/>
+                </a:solidFill>
+              </a:rPr>
+              <a:t>Борьба с переобучением.</a:t>
+            </a:r>
+          </a:p>
+          <a:p>
+            <a:pPr marL="502920" indent="-457200">
+              <a:buFont typeface="+mj-lt"/>
+              <a:buAutoNum type="arabicPeriod"/>
+            </a:pPr>
+            <a:endParaRPr lang="ru-RU" sz="2000" dirty="0" smtClean="0">
+              <a:solidFill>
+                <a:schemeClr val="tx1"/>
+              </a:solidFill>
+            </a:endParaRPr>
+          </a:p>
+          <a:p>
+            <a:pPr marL="45720" indent="0">
+              <a:buNone/>
+            </a:pPr>
+            <a:endParaRPr lang="en-US" sz="2000" dirty="0">
+              <a:solidFill>
+                <a:schemeClr val="tx1"/>
+              </a:solidFill>
+            </a:endParaRPr>
+          </a:p>
+        </p:txBody>
+      </p:sp>
+    </p:spTree>
+    <p:extLst>
+      <p:ext uri="{BB962C8B-B14F-4D97-AF65-F5344CB8AC3E}">
+        <p14:creationId xmlns:p14="http://schemas.microsoft.com/office/powerpoint/2010/main" val="460937769"/>
+      </p:ext>
+    </p:extLst>
+  </p:cSld>
+  <p:clrMapOvr>
+    <a:masterClrMapping/>
+  </p:clrMapOvr>
+</p:sld>
+</file>
+
+<file path=ppt/slides/slide18.xml><?xml version="1.0" encoding="utf-8"?>
+<p:sld xmlns:a="http://schemas.openxmlformats.org/drawingml/2006/main" xmlns:r="http://schemas.openxmlformats.org/officeDocument/2006/relationships" xmlns:p="http://schemas.openxmlformats.org/presentationml/2006/main">
+  <p:cSld>
+    <p:spTree>
+      <p:nvGrpSpPr>
+        <p:cNvPr id="1" name=""/>
+        <p:cNvGrpSpPr/>
+        <p:nvPr/>
+      </p:nvGrpSpPr>
+      <p:grpSpPr>
+        <a:xfrm>
+          <a:off x="0" y="0"/>
+          <a:ext cx="0" cy="0"/>
+          <a:chOff x="0" y="0"/>
+          <a:chExt cx="0" cy="0"/>
+        </a:xfrm>
+      </p:grpSpPr>
+      <p:sp>
+        <p:nvSpPr>
+          <p:cNvPr id="2" name="Заголовок 1"/>
+          <p:cNvSpPr>
+            <a:spLocks noGrp="1"/>
+          </p:cNvSpPr>
+          <p:nvPr>
+            <p:ph type="title"/>
+          </p:nvPr>
+        </p:nvSpPr>
+        <p:spPr>
+          <a:xfrm>
+            <a:off x="838200" y="365125"/>
+            <a:ext cx="10515600" cy="760673"/>
+          </a:xfrm>
+        </p:spPr>
+        <p:txBody>
+          <a:bodyPr>
+            <a:noAutofit/>
+          </a:bodyPr>
+          <a:lstStyle/>
+          <a:p>
+            <a:r>
+              <a:rPr lang="ru-RU" sz="3200" dirty="0" smtClean="0"/>
+              <a:t>Заключение</a:t>
+            </a:r>
+            <a:endParaRPr lang="ru-RU" sz="4800" dirty="0"/>
+          </a:p>
+        </p:txBody>
+      </p:sp>
+      <p:sp>
+        <p:nvSpPr>
+          <p:cNvPr id="11" name="Номер слайда 10">
+            <a:extLst>
+              <a:ext uri="{FF2B5EF4-FFF2-40B4-BE49-F238E27FC236}">
+                <a16:creationId xmlns:a16="http://schemas.microsoft.com/office/drawing/2014/main" id="{3A91D745-9CA6-414C-AEAB-25A55984B29C}"/>
+              </a:ext>
+            </a:extLst>
+          </p:cNvPr>
+          <p:cNvSpPr>
+            <a:spLocks noGrp="1"/>
+          </p:cNvSpPr>
+          <p:nvPr>
+            <p:ph type="sldNum" sz="quarter" idx="12"/>
+          </p:nvPr>
+        </p:nvSpPr>
+        <p:spPr/>
+        <p:txBody>
+          <a:bodyPr/>
+          <a:lstStyle/>
+          <a:p>
+            <a:fld id="{871F4C9F-061D-468D-90C1-298C9849AF70}" type="slidenum">
+              <a:rPr lang="ru-RU" smtClean="0"/>
+              <a:pPr/>
+              <a:t>18</a:t>
+            </a:fld>
+            <a:r>
+              <a:rPr lang="en-US"/>
+              <a:t>/</a:t>
+            </a:r>
+            <a:r>
+              <a:rPr lang="ru-RU"/>
+              <a:t>20</a:t>
+            </a:r>
+            <a:endParaRPr lang="ru-RU" dirty="0"/>
+          </a:p>
+        </p:txBody>
+      </p:sp>
+      <p:sp>
+        <p:nvSpPr>
+          <p:cNvPr id="7" name="Объект 4">
+            <a:extLst>
+              <a:ext uri="{FF2B5EF4-FFF2-40B4-BE49-F238E27FC236}">
+                <a16:creationId xmlns:a16="http://schemas.microsoft.com/office/drawing/2014/main" id="{CECBFFEE-5029-4E7A-AB57-EE46E254E3E1}"/>
+              </a:ext>
+            </a:extLst>
+          </p:cNvPr>
+          <p:cNvSpPr>
+            <a:spLocks noGrp="1"/>
+          </p:cNvSpPr>
+          <p:nvPr>
+            <p:ph idx="1"/>
+          </p:nvPr>
+        </p:nvSpPr>
+        <p:spPr>
+          <a:xfrm>
+            <a:off x="838200" y="1125798"/>
+            <a:ext cx="10515599" cy="3682685"/>
+          </a:xfrm>
+        </p:spPr>
+        <p:txBody>
+          <a:bodyPr/>
+          <a:lstStyle/>
+          <a:p>
+            <a:pPr marL="45720" indent="0">
+              <a:buNone/>
+            </a:pPr>
+            <a:endParaRPr lang="ru-RU" sz="2000" dirty="0" smtClean="0">
+              <a:solidFill>
+                <a:schemeClr val="tx1"/>
+              </a:solidFill>
+            </a:endParaRPr>
+          </a:p>
+          <a:p>
+            <a:pPr marL="45720" indent="0">
+              <a:buNone/>
+            </a:pPr>
+            <a:endParaRPr lang="en-US" sz="2000" dirty="0">
+              <a:solidFill>
+                <a:schemeClr val="tx1"/>
+              </a:solidFill>
+            </a:endParaRPr>
+          </a:p>
+        </p:txBody>
+      </p:sp>
+    </p:spTree>
+    <p:extLst>
+      <p:ext uri="{BB962C8B-B14F-4D97-AF65-F5344CB8AC3E}">
+        <p14:creationId xmlns:p14="http://schemas.microsoft.com/office/powerpoint/2010/main" val="1450583172"/>
+      </p:ext>
+    </p:extLst>
+  </p:cSld>
+  <p:clrMapOvr>
+    <a:masterClrMapping/>
+  </p:clrMapOvr>
+</p:sld>
+</file>
+
+<file path=ppt/slides/slide19.xml><?xml version="1.0" encoding="utf-8"?>
+<p:sld xmlns:a="http://schemas.openxmlformats.org/drawingml/2006/main" xmlns:r="http://schemas.openxmlformats.org/officeDocument/2006/relationships" xmlns:p="http://schemas.openxmlformats.org/presentationml/2006/main">
+  <p:cSld>
+    <p:spTree>
+      <p:nvGrpSpPr>
+        <p:cNvPr id="1" name=""/>
+        <p:cNvGrpSpPr/>
+        <p:nvPr/>
+      </p:nvGrpSpPr>
+      <p:grpSpPr>
+        <a:xfrm>
+          <a:off x="0" y="0"/>
+          <a:ext cx="0" cy="0"/>
+          <a:chOff x="0" y="0"/>
+          <a:chExt cx="0" cy="0"/>
+        </a:xfrm>
+      </p:grpSpPr>
+      <p:sp>
+        <p:nvSpPr>
+          <p:cNvPr id="2" name="Заголовок 1"/>
+          <p:cNvSpPr>
+            <a:spLocks noGrp="1"/>
+          </p:cNvSpPr>
+          <p:nvPr>
+            <p:ph type="ctrTitle"/>
+          </p:nvPr>
+        </p:nvSpPr>
+        <p:spPr/>
+        <p:txBody>
+          <a:bodyPr>
+            <a:normAutofit/>
+          </a:bodyPr>
+          <a:lstStyle/>
+          <a:p>
+            <a:r>
+              <a:rPr lang="ru-RU" sz="4400" dirty="0" smtClean="0"/>
+              <a:t>Спасибо за внимание! </a:t>
+            </a:r>
+            <a:endParaRPr lang="ru-RU" sz="4400" dirty="0"/>
+          </a:p>
+        </p:txBody>
+      </p:sp>
+    </p:spTree>
+    <p:extLst>
+      <p:ext uri="{BB962C8B-B14F-4D97-AF65-F5344CB8AC3E}">
+        <p14:creationId xmlns:p14="http://schemas.microsoft.com/office/powerpoint/2010/main" val="4173907562"/>
       </p:ext>
     </p:extLst>
   </p:cSld>

</xml_diff>